<commit_message>
Floating Point, OS Virtual Address & File System revision
</commit_message>
<xml_diff>
--- a/GATE/Operating System 10% - Completed/CH 06 - Virtual Memory - completed/Types of Question from VM - completed.pptx
+++ b/GATE/Operating System 10% - Completed/CH 06 - Virtual Memory - completed/Types of Question from VM - completed.pptx
@@ -12,7 +12,9 @@
     <p:sldId id="266" r:id="rId6"/>
     <p:sldId id="267" r:id="rId7"/>
     <p:sldId id="258" r:id="rId8"/>
-    <p:sldId id="265" r:id="rId9"/>
+    <p:sldId id="268" r:id="rId9"/>
+    <p:sldId id="269" r:id="rId10"/>
+    <p:sldId id="265" r:id="rId11"/>
   </p:sldIdLst>
   <p:sldSz cx="12192000" cy="6858000"/>
   <p:notesSz cx="6858000" cy="9144000"/>
@@ -268,7 +270,7 @@
           <a:p>
             <a:fld id="{B99FDF59-A728-4F91-B2A5-E4C0966F68DC}" type="datetimeFigureOut">
               <a:rPr lang="en-IN" smtClean="0"/>
-              <a:t>20-12-2025</a:t>
+              <a:t>24-01-2026</a:t>
             </a:fld>
             <a:endParaRPr lang="en-IN"/>
           </a:p>
@@ -468,7 +470,7 @@
           <a:p>
             <a:fld id="{B99FDF59-A728-4F91-B2A5-E4C0966F68DC}" type="datetimeFigureOut">
               <a:rPr lang="en-IN" smtClean="0"/>
-              <a:t>20-12-2025</a:t>
+              <a:t>24-01-2026</a:t>
             </a:fld>
             <a:endParaRPr lang="en-IN"/>
           </a:p>
@@ -678,7 +680,7 @@
           <a:p>
             <a:fld id="{B99FDF59-A728-4F91-B2A5-E4C0966F68DC}" type="datetimeFigureOut">
               <a:rPr lang="en-IN" smtClean="0"/>
-              <a:t>20-12-2025</a:t>
+              <a:t>24-01-2026</a:t>
             </a:fld>
             <a:endParaRPr lang="en-IN"/>
           </a:p>
@@ -878,7 +880,7 @@
           <a:p>
             <a:fld id="{B99FDF59-A728-4F91-B2A5-E4C0966F68DC}" type="datetimeFigureOut">
               <a:rPr lang="en-IN" smtClean="0"/>
-              <a:t>20-12-2025</a:t>
+              <a:t>24-01-2026</a:t>
             </a:fld>
             <a:endParaRPr lang="en-IN"/>
           </a:p>
@@ -1154,7 +1156,7 @@
           <a:p>
             <a:fld id="{B99FDF59-A728-4F91-B2A5-E4C0966F68DC}" type="datetimeFigureOut">
               <a:rPr lang="en-IN" smtClean="0"/>
-              <a:t>20-12-2025</a:t>
+              <a:t>24-01-2026</a:t>
             </a:fld>
             <a:endParaRPr lang="en-IN"/>
           </a:p>
@@ -1422,7 +1424,7 @@
           <a:p>
             <a:fld id="{B99FDF59-A728-4F91-B2A5-E4C0966F68DC}" type="datetimeFigureOut">
               <a:rPr lang="en-IN" smtClean="0"/>
-              <a:t>20-12-2025</a:t>
+              <a:t>24-01-2026</a:t>
             </a:fld>
             <a:endParaRPr lang="en-IN"/>
           </a:p>
@@ -1837,7 +1839,7 @@
           <a:p>
             <a:fld id="{B99FDF59-A728-4F91-B2A5-E4C0966F68DC}" type="datetimeFigureOut">
               <a:rPr lang="en-IN" smtClean="0"/>
-              <a:t>20-12-2025</a:t>
+              <a:t>24-01-2026</a:t>
             </a:fld>
             <a:endParaRPr lang="en-IN"/>
           </a:p>
@@ -1979,7 +1981,7 @@
           <a:p>
             <a:fld id="{B99FDF59-A728-4F91-B2A5-E4C0966F68DC}" type="datetimeFigureOut">
               <a:rPr lang="en-IN" smtClean="0"/>
-              <a:t>20-12-2025</a:t>
+              <a:t>24-01-2026</a:t>
             </a:fld>
             <a:endParaRPr lang="en-IN"/>
           </a:p>
@@ -2092,7 +2094,7 @@
           <a:p>
             <a:fld id="{B99FDF59-A728-4F91-B2A5-E4C0966F68DC}" type="datetimeFigureOut">
               <a:rPr lang="en-IN" smtClean="0"/>
-              <a:t>20-12-2025</a:t>
+              <a:t>24-01-2026</a:t>
             </a:fld>
             <a:endParaRPr lang="en-IN"/>
           </a:p>
@@ -2405,7 +2407,7 @@
           <a:p>
             <a:fld id="{B99FDF59-A728-4F91-B2A5-E4C0966F68DC}" type="datetimeFigureOut">
               <a:rPr lang="en-IN" smtClean="0"/>
-              <a:t>20-12-2025</a:t>
+              <a:t>24-01-2026</a:t>
             </a:fld>
             <a:endParaRPr lang="en-IN"/>
           </a:p>
@@ -2694,7 +2696,7 @@
           <a:p>
             <a:fld id="{B99FDF59-A728-4F91-B2A5-E4C0966F68DC}" type="datetimeFigureOut">
               <a:rPr lang="en-IN" smtClean="0"/>
-              <a:t>20-12-2025</a:t>
+              <a:t>24-01-2026</a:t>
             </a:fld>
             <a:endParaRPr lang="en-IN"/>
           </a:p>
@@ -2937,7 +2939,7 @@
           <a:p>
             <a:fld id="{B99FDF59-A728-4F91-B2A5-E4C0966F68DC}" type="datetimeFigureOut">
               <a:rPr lang="en-IN" smtClean="0"/>
-              <a:t>20-12-2025</a:t>
+              <a:t>24-01-2026</a:t>
             </a:fld>
             <a:endParaRPr lang="en-IN"/>
           </a:p>
@@ -3423,6 +3425,68 @@
 </p:sld>
 </file>
 
+<file path=ppt/slides/slide10.xml><?xml version="1.0" encoding="utf-8"?>
+<p:sld xmlns:a="http://schemas.openxmlformats.org/drawingml/2006/main" xmlns:r="http://schemas.openxmlformats.org/officeDocument/2006/relationships" xmlns:p="http://schemas.openxmlformats.org/presentationml/2006/main">
+  <p:cSld>
+    <p:spTree>
+      <p:nvGrpSpPr>
+        <p:cNvPr id="1" name=""/>
+        <p:cNvGrpSpPr/>
+        <p:nvPr/>
+      </p:nvGrpSpPr>
+      <p:grpSpPr>
+        <a:xfrm>
+          <a:off x="0" y="0"/>
+          <a:ext cx="0" cy="0"/>
+          <a:chOff x="0" y="0"/>
+          <a:chExt cx="0" cy="0"/>
+        </a:xfrm>
+      </p:grpSpPr>
+      <p:sp>
+        <p:nvSpPr>
+          <p:cNvPr id="2" name="Title 1">
+            <a:extLst>
+              <a:ext uri="{FF2B5EF4-FFF2-40B4-BE49-F238E27FC236}">
+                <a16:creationId xmlns:a16="http://schemas.microsoft.com/office/drawing/2014/main" id="{78480C44-B5A6-4AA3-83DD-2D2282DA8B53}"/>
+              </a:ext>
+            </a:extLst>
+          </p:cNvPr>
+          <p:cNvSpPr>
+            <a:spLocks noGrp="1"/>
+          </p:cNvSpPr>
+          <p:nvPr>
+            <p:ph type="title"/>
+          </p:nvPr>
+        </p:nvSpPr>
+        <p:spPr/>
+        <p:txBody>
+          <a:bodyPr/>
+          <a:lstStyle/>
+          <a:p>
+            <a:r>
+              <a:rPr lang="en-IN" b="1" dirty="0">
+                <a:solidFill>
+                  <a:srgbClr val="FF0000"/>
+                </a:solidFill>
+              </a:rPr>
+              <a:t>Thank You</a:t>
+            </a:r>
+          </a:p>
+        </p:txBody>
+      </p:sp>
+    </p:spTree>
+    <p:extLst>
+      <p:ext uri="{BB962C8B-B14F-4D97-AF65-F5344CB8AC3E}">
+        <p14:creationId xmlns:p14="http://schemas.microsoft.com/office/powerpoint/2010/main" val="2344031977"/>
+      </p:ext>
+    </p:extLst>
+  </p:cSld>
+  <p:clrMapOvr>
+    <a:masterClrMapping/>
+  </p:clrMapOvr>
+</p:sld>
+</file>
+
 <file path=ppt/slides/slide2.xml><?xml version="1.0" encoding="utf-8"?>
 <p:sld xmlns:a="http://schemas.openxmlformats.org/drawingml/2006/main" xmlns:r="http://schemas.openxmlformats.org/officeDocument/2006/relationships" xmlns:p="http://schemas.openxmlformats.org/presentationml/2006/main">
   <p:cSld>
@@ -4338,42 +4402,190 @@
           <a:chExt cx="0" cy="0"/>
         </a:xfrm>
       </p:grpSpPr>
-      <p:sp>
-        <p:nvSpPr>
-          <p:cNvPr id="2" name="Title 1">
-            <a:extLst>
-              <a:ext uri="{FF2B5EF4-FFF2-40B4-BE49-F238E27FC236}">
-                <a16:creationId xmlns:a16="http://schemas.microsoft.com/office/drawing/2014/main" id="{78480C44-B5A6-4AA3-83DD-2D2282DA8B53}"/>
-              </a:ext>
-            </a:extLst>
-          </p:cNvPr>
-          <p:cNvSpPr>
-            <a:spLocks noGrp="1"/>
-          </p:cNvSpPr>
-          <p:nvPr>
-            <p:ph type="title"/>
-          </p:nvPr>
-        </p:nvSpPr>
-        <p:spPr/>
-        <p:txBody>
-          <a:bodyPr/>
-          <a:lstStyle/>
-          <a:p>
-            <a:r>
-              <a:rPr lang="en-IN" b="1" dirty="0">
-                <a:solidFill>
-                  <a:srgbClr val="FF0000"/>
-                </a:solidFill>
-              </a:rPr>
-              <a:t>Thank You</a:t>
-            </a:r>
-          </a:p>
-        </p:txBody>
-      </p:sp>
+      <p:pic>
+        <p:nvPicPr>
+          <p:cNvPr id="3" name="Picture 2">
+            <a:extLst>
+              <a:ext uri="{FF2B5EF4-FFF2-40B4-BE49-F238E27FC236}">
+                <a16:creationId xmlns:a16="http://schemas.microsoft.com/office/drawing/2014/main" id="{98AA05C3-71BF-4FE3-A315-847ADEB4C5A1}"/>
+              </a:ext>
+            </a:extLst>
+          </p:cNvPr>
+          <p:cNvPicPr>
+            <a:picLocks noChangeAspect="1"/>
+          </p:cNvPicPr>
+          <p:nvPr/>
+        </p:nvPicPr>
+        <p:blipFill>
+          <a:blip r:embed="rId2"/>
+          <a:stretch>
+            <a:fillRect/>
+          </a:stretch>
+        </p:blipFill>
+        <p:spPr>
+          <a:xfrm>
+            <a:off x="79488" y="2590878"/>
+            <a:ext cx="12033023" cy="922100"/>
+          </a:xfrm>
+          <a:prstGeom prst="rect">
+            <a:avLst/>
+          </a:prstGeom>
+        </p:spPr>
+      </p:pic>
+      <p:pic>
+        <p:nvPicPr>
+          <p:cNvPr id="5" name="Picture 4">
+            <a:extLst>
+              <a:ext uri="{FF2B5EF4-FFF2-40B4-BE49-F238E27FC236}">
+                <a16:creationId xmlns:a16="http://schemas.microsoft.com/office/drawing/2014/main" id="{BA0B5A14-DED6-40FE-866D-C5F67616F232}"/>
+              </a:ext>
+            </a:extLst>
+          </p:cNvPr>
+          <p:cNvPicPr>
+            <a:picLocks noChangeAspect="1"/>
+          </p:cNvPicPr>
+          <p:nvPr/>
+        </p:nvPicPr>
+        <p:blipFill>
+          <a:blip r:embed="rId3"/>
+          <a:stretch>
+            <a:fillRect/>
+          </a:stretch>
+        </p:blipFill>
+        <p:spPr>
+          <a:xfrm>
+            <a:off x="479571" y="4379838"/>
+            <a:ext cx="11232854" cy="1114903"/>
+          </a:xfrm>
+          <a:prstGeom prst="rect">
+            <a:avLst/>
+          </a:prstGeom>
+        </p:spPr>
+      </p:pic>
+      <p:pic>
+        <p:nvPicPr>
+          <p:cNvPr id="7" name="Picture 6">
+            <a:extLst>
+              <a:ext uri="{FF2B5EF4-FFF2-40B4-BE49-F238E27FC236}">
+                <a16:creationId xmlns:a16="http://schemas.microsoft.com/office/drawing/2014/main" id="{77D70AF7-F3A2-4AD4-88B2-5AAF4962A9B7}"/>
+              </a:ext>
+            </a:extLst>
+          </p:cNvPr>
+          <p:cNvPicPr>
+            <a:picLocks noChangeAspect="1"/>
+          </p:cNvPicPr>
+          <p:nvPr/>
+        </p:nvPicPr>
+        <p:blipFill>
+          <a:blip r:embed="rId4"/>
+          <a:stretch>
+            <a:fillRect/>
+          </a:stretch>
+        </p:blipFill>
+        <p:spPr>
+          <a:xfrm>
+            <a:off x="79488" y="593572"/>
+            <a:ext cx="11895851" cy="769687"/>
+          </a:xfrm>
+          <a:prstGeom prst="rect">
+            <a:avLst/>
+          </a:prstGeom>
+        </p:spPr>
+      </p:pic>
     </p:spTree>
     <p:extLst>
       <p:ext uri="{BB962C8B-B14F-4D97-AF65-F5344CB8AC3E}">
-        <p14:creationId xmlns:p14="http://schemas.microsoft.com/office/powerpoint/2010/main" val="2344031977"/>
+        <p14:creationId xmlns:p14="http://schemas.microsoft.com/office/powerpoint/2010/main" val="3325051553"/>
+      </p:ext>
+    </p:extLst>
+  </p:cSld>
+  <p:clrMapOvr>
+    <a:masterClrMapping/>
+  </p:clrMapOvr>
+</p:sld>
+</file>
+
+<file path=ppt/slides/slide9.xml><?xml version="1.0" encoding="utf-8"?>
+<p:sld xmlns:a="http://schemas.openxmlformats.org/drawingml/2006/main" xmlns:r="http://schemas.openxmlformats.org/officeDocument/2006/relationships" xmlns:p="http://schemas.openxmlformats.org/presentationml/2006/main">
+  <p:cSld>
+    <p:spTree>
+      <p:nvGrpSpPr>
+        <p:cNvPr id="1" name=""/>
+        <p:cNvGrpSpPr/>
+        <p:nvPr/>
+      </p:nvGrpSpPr>
+      <p:grpSpPr>
+        <a:xfrm>
+          <a:off x="0" y="0"/>
+          <a:ext cx="0" cy="0"/>
+          <a:chOff x="0" y="0"/>
+          <a:chExt cx="0" cy="0"/>
+        </a:xfrm>
+      </p:grpSpPr>
+      <p:pic>
+        <p:nvPicPr>
+          <p:cNvPr id="3" name="Picture 2">
+            <a:extLst>
+              <a:ext uri="{FF2B5EF4-FFF2-40B4-BE49-F238E27FC236}">
+                <a16:creationId xmlns:a16="http://schemas.microsoft.com/office/drawing/2014/main" id="{456A663D-946F-4577-9556-490A66179D53}"/>
+              </a:ext>
+            </a:extLst>
+          </p:cNvPr>
+          <p:cNvPicPr>
+            <a:picLocks noChangeAspect="1"/>
+          </p:cNvPicPr>
+          <p:nvPr/>
+        </p:nvPicPr>
+        <p:blipFill>
+          <a:blip r:embed="rId2"/>
+          <a:stretch>
+            <a:fillRect/>
+          </a:stretch>
+        </p:blipFill>
+        <p:spPr>
+          <a:xfrm>
+            <a:off x="206676" y="0"/>
+            <a:ext cx="6440091" cy="6858000"/>
+          </a:xfrm>
+          <a:prstGeom prst="rect">
+            <a:avLst/>
+          </a:prstGeom>
+        </p:spPr>
+      </p:pic>
+      <p:pic>
+        <p:nvPicPr>
+          <p:cNvPr id="4" name="Picture 3">
+            <a:extLst>
+              <a:ext uri="{FF2B5EF4-FFF2-40B4-BE49-F238E27FC236}">
+                <a16:creationId xmlns:a16="http://schemas.microsoft.com/office/drawing/2014/main" id="{59E890CE-656E-4B36-9B7A-A6A6AFE6E242}"/>
+              </a:ext>
+            </a:extLst>
+          </p:cNvPr>
+          <p:cNvPicPr>
+            <a:picLocks noChangeAspect="1"/>
+          </p:cNvPicPr>
+          <p:nvPr/>
+        </p:nvPicPr>
+        <p:blipFill>
+          <a:blip r:embed="rId3"/>
+          <a:stretch>
+            <a:fillRect/>
+          </a:stretch>
+        </p:blipFill>
+        <p:spPr>
+          <a:xfrm>
+            <a:off x="5275589" y="708462"/>
+            <a:ext cx="6709735" cy="463720"/>
+          </a:xfrm>
+          <a:prstGeom prst="rect">
+            <a:avLst/>
+          </a:prstGeom>
+        </p:spPr>
+      </p:pic>
+    </p:spTree>
+    <p:extLst>
+      <p:ext uri="{BB962C8B-B14F-4D97-AF65-F5344CB8AC3E}">
+        <p14:creationId xmlns:p14="http://schemas.microsoft.com/office/powerpoint/2010/main" val="3778208562"/>
       </p:ext>
     </p:extLst>
   </p:cSld>

</xml_diff>